<commit_message>
Fix bugs during talk
</commit_message>
<xml_diff>
--- a/animating-powerpoint-with-data.pptx
+++ b/animating-powerpoint-with-data.pptx
@@ -13125,7 +13125,7 @@
                 <a:latin typeface="Consolas" panose="020B0609020204030204" pitchFamily="49" charset="0"/>
                 <a:cs typeface="Open Sans" panose="020B0606030504020204" pitchFamily="34" charset="0"/>
               </a:rPr>
-              <a:t>slidesense</a:t>
+              <a:t>gramex</a:t>
             </a:r>
             <a:r>
               <a:rPr kumimoji="0" lang="en-US" altLang="en-US" sz="1600" b="0" i="0" u="none" strike="noStrike" cap="none" normalizeH="0" baseline="0" dirty="0">
@@ -14245,7 +14245,7 @@
                 <a:latin typeface="Consolas" panose="020B0609020204030204" pitchFamily="49" charset="0"/>
                 <a:cs typeface="Open Sans" panose="020B0606030504020204" pitchFamily="34" charset="0"/>
               </a:rPr>
-              <a:t>slidesense</a:t>
+              <a:t>gramex</a:t>
             </a:r>
             <a:r>
               <a:rPr kumimoji="0" lang="en-US" altLang="en-US" sz="1600" b="0" i="0" u="none" strike="noStrike" cap="none" normalizeH="0" baseline="0" dirty="0">
@@ -15364,7 +15364,7 @@
                 <a:latin typeface="Consolas" panose="020B0609020204030204" pitchFamily="49" charset="0"/>
                 <a:cs typeface="Open Sans" panose="020B0606030504020204" pitchFamily="34" charset="0"/>
               </a:rPr>
-              <a:t>slidesense</a:t>
+              <a:t>gramex</a:t>
             </a:r>
             <a:r>
               <a:rPr kumimoji="0" lang="en-US" altLang="en-US" sz="1600" b="0" i="0" u="none" strike="noStrike" cap="none" normalizeH="0" baseline="0" dirty="0">
@@ -16486,7 +16486,7 @@
                 <a:latin typeface="Consolas" panose="020B0609020204030204" pitchFamily="49" charset="0"/>
                 <a:cs typeface="Open Sans" panose="020B0606030504020204" pitchFamily="34" charset="0"/>
               </a:rPr>
-              <a:t>slidesense</a:t>
+              <a:t>gramex</a:t>
             </a:r>
             <a:r>
               <a:rPr kumimoji="0" lang="en-US" altLang="en-US" sz="1600" b="0" i="0" u="none" strike="noStrike" cap="none" normalizeH="0" baseline="0" dirty="0">
@@ -18548,7 +18548,7 @@
                 <a:latin typeface="Consolas" panose="020B0609020204030204" pitchFamily="49" charset="0"/>
                 <a:cs typeface="Open Sans" panose="020B0606030504020204" pitchFamily="34" charset="0"/>
               </a:rPr>
-              <a:t>slidesense</a:t>
+              <a:t>gramex</a:t>
             </a:r>
             <a:r>
               <a:rPr kumimoji="0" lang="en-US" altLang="en-US" sz="1600" b="0" i="0" u="none" strike="noStrike" cap="none" normalizeH="0" baseline="0" dirty="0">
@@ -29675,7 +29675,7 @@
                 <a:latin typeface="Consolas" panose="020B0609020204030204" pitchFamily="49" charset="0"/>
                 <a:cs typeface="Open Sans" panose="020B0606030504020204" pitchFamily="34" charset="0"/>
               </a:rPr>
-              <a:t>slidesense</a:t>
+              <a:t>gramex</a:t>
             </a:r>
             <a:r>
               <a:rPr kumimoji="0" lang="en-US" altLang="en-US" sz="1600" b="0" i="0" u="none" strike="noStrike" cap="none" normalizeH="0" baseline="0" dirty="0">
@@ -30790,7 +30790,7 @@
                 <a:latin typeface="Consolas" panose="020B0609020204030204" pitchFamily="49" charset="0"/>
                 <a:cs typeface="Open Sans" panose="020B0606030504020204" pitchFamily="34" charset="0"/>
               </a:rPr>
-              <a:t>slidesense</a:t>
+              <a:t>gramex</a:t>
             </a:r>
             <a:r>
               <a:rPr kumimoji="0" lang="en-US" altLang="en-US" sz="1600" b="0" i="0" u="none" strike="noStrike" cap="none" normalizeH="0" baseline="0" dirty="0">
@@ -31904,7 +31904,7 @@
                 <a:latin typeface="Consolas" panose="020B0609020204030204" pitchFamily="49" charset="0"/>
                 <a:cs typeface="Open Sans" panose="020B0606030504020204" pitchFamily="34" charset="0"/>
               </a:rPr>
-              <a:t>slidesense</a:t>
+              <a:t>gramex</a:t>
             </a:r>
             <a:r>
               <a:rPr kumimoji="0" lang="en-US" altLang="en-US" sz="1600" b="0" i="0" u="none" strike="noStrike" cap="none" normalizeH="0" baseline="0" dirty="0">
@@ -34153,7 +34153,7 @@
                 <a:latin typeface="Consolas" panose="020B0609020204030204" pitchFamily="49" charset="0"/>
                 <a:cs typeface="Open Sans" panose="020B0606030504020204" pitchFamily="34" charset="0"/>
               </a:rPr>
-              <a:t>slidesense</a:t>
+              <a:t>gramex</a:t>
             </a:r>
             <a:r>
               <a:rPr kumimoji="0" lang="en-US" altLang="en-US" sz="1600" b="0" i="0" u="none" strike="noStrike" cap="none" normalizeH="0" baseline="0" dirty="0">
@@ -35256,18 +35256,14 @@
               <a:t>pip install </a:t>
             </a:r>
             <a:r>
-              <a:rPr kumimoji="0" lang="en-US" altLang="en-US" sz="1600" b="0" i="0" u="none" strike="noStrike" cap="none" normalizeH="0" baseline="0" dirty="0" err="1">
-                <a:ln>
-                  <a:noFill/>
-                </a:ln>
+              <a:rPr lang="en-US" altLang="en-US" sz="1600" dirty="0" err="1">
                 <a:solidFill>
                   <a:srgbClr val="C7254E"/>
                 </a:solidFill>
-                <a:effectLst/>
                 <a:latin typeface="Consolas" panose="020B0609020204030204" pitchFamily="49" charset="0"/>
                 <a:cs typeface="Open Sans" panose="020B0606030504020204" pitchFamily="34" charset="0"/>
               </a:rPr>
-              <a:t>slidesense</a:t>
+              <a:t>gramex</a:t>
             </a:r>
             <a:r>
               <a:rPr kumimoji="0" lang="en-US" altLang="en-US" sz="1600" b="0" i="0" u="none" strike="noStrike" cap="none" normalizeH="0" baseline="0" dirty="0">

</xml_diff>